<commit_message>
Second version of Section 5.pptx
</commit_message>
<xml_diff>
--- a/Final_Project/presentation/Rick/Section 5.pptx
+++ b/Final_Project/presentation/Rick/Section 5.pptx
@@ -109,6 +109,11 @@
       </a:defRPr>
     </a:lvl9pPr>
   </p:defaultTextStyle>
+  <p:extLst>
+    <p:ext uri="{EFAFB233-063F-42B5-8137-9DF3F51BA10A}">
+      <p15:sldGuideLst xmlns:p15="http://schemas.microsoft.com/office/powerpoint/2012/main"/>
+    </p:ext>
+  </p:extLst>
 </p:presentation>
 </file>
 
@@ -3483,7 +3488,9 @@
         </p:nvSpPr>
         <p:spPr/>
         <p:txBody>
-          <a:bodyPr/>
+          <a:bodyPr>
+            <a:normAutofit fontScale="92500" lnSpcReduction="10000"/>
+          </a:bodyPr>
           <a:lstStyle/>
           <a:p>
             <a:endParaRPr lang="en-AU" dirty="0"/>
@@ -3498,6 +3505,72 @@
             <a:r>
               <a:rPr lang="en-AU" dirty="0"/>
               <a:t>Back-end developer</a:t>
+            </a:r>
+          </a:p>
+          <a:p>
+            <a:r>
+              <a:rPr lang="en-AU" dirty="0"/>
+              <a:t>I was responsible for</a:t>
+            </a:r>
+            <a:br>
+              <a:rPr lang="en-AU" dirty="0"/>
+            </a:br>
+            <a:r>
+              <a:rPr lang="en-AU" dirty="0"/>
+              <a:t>researching potential</a:t>
+            </a:r>
+            <a:br>
+              <a:rPr lang="en-AU" dirty="0"/>
+            </a:br>
+            <a:r>
+              <a:rPr lang="en-AU" dirty="0"/>
+              <a:t>open-source methods </a:t>
+            </a:r>
+            <a:br>
+              <a:rPr lang="en-AU" dirty="0"/>
+            </a:br>
+            <a:r>
+              <a:rPr lang="en-AU" dirty="0"/>
+              <a:t>of extracting file metadata </a:t>
+            </a:r>
+            <a:br>
+              <a:rPr lang="en-AU" dirty="0"/>
+            </a:br>
+            <a:r>
+              <a:rPr lang="en-AU" dirty="0"/>
+              <a:t>on the command line, and </a:t>
+            </a:r>
+            <a:br>
+              <a:rPr lang="en-AU"/>
+            </a:br>
+            <a:r>
+              <a:rPr lang="en-AU"/>
+              <a:t>then helping </a:t>
+            </a:r>
+            <a:r>
+              <a:rPr lang="en-AU" dirty="0"/>
+              <a:t>to </a:t>
+            </a:r>
+            <a:br>
+              <a:rPr lang="en-AU" dirty="0"/>
+            </a:br>
+            <a:r>
+              <a:rPr lang="en-AU" dirty="0"/>
+              <a:t>implement the python </a:t>
+            </a:r>
+            <a:br>
+              <a:rPr lang="en-AU" dirty="0"/>
+            </a:br>
+            <a:r>
+              <a:rPr lang="en-AU" dirty="0"/>
+              <a:t>libraries that were ultimately </a:t>
+            </a:r>
+            <a:br>
+              <a:rPr lang="en-AU" dirty="0"/>
+            </a:br>
+            <a:r>
+              <a:rPr lang="en-AU" dirty="0"/>
+              <a:t>chosen</a:t>
             </a:r>
           </a:p>
           <a:p>

</xml_diff>